<commit_message>
MVP code for district wise calculation
</commit_message>
<xml_diff>
--- a/week-3.pptx
+++ b/week-3.pptx
@@ -5,7 +5,7 @@
     <p:sldMasterId id="2147483648" r:id="rId1"/>
   </p:sldMasterIdLst>
   <p:notesMasterIdLst>
-    <p:notesMasterId r:id="rId13"/>
+    <p:notesMasterId r:id="rId14"/>
   </p:notesMasterIdLst>
   <p:sldIdLst>
     <p:sldId id="256" r:id="rId2"/>
@@ -19,6 +19,7 @@
     <p:sldId id="270" r:id="rId10"/>
     <p:sldId id="277" r:id="rId11"/>
     <p:sldId id="260" r:id="rId12"/>
+    <p:sldId id="279" r:id="rId13"/>
   </p:sldIdLst>
   <p:sldSz cx="12192000" cy="6858000"/>
   <p:notesSz cx="6858000" cy="9144000"/>
@@ -207,7 +208,7 @@
           <a:p>
             <a:fld id="{1C52D7C2-8534-4E7A-ABC4-691EAD8C514E}" type="datetimeFigureOut">
               <a:rPr lang="en-IN" smtClean="0"/>
-              <a:t>19-06-2021</a:t>
+              <a:t>22-06-2021</a:t>
             </a:fld>
             <a:endParaRPr lang="en-IN"/>
           </a:p>
@@ -708,7 +709,7 @@
           <a:p>
             <a:fld id="{C13FBCF6-97A0-4024-9E89-2567FE0DCFCF}" type="datetimeFigureOut">
               <a:rPr lang="en-IN" smtClean="0"/>
-              <a:t>19-06-2021</a:t>
+              <a:t>22-06-2021</a:t>
             </a:fld>
             <a:endParaRPr lang="en-IN"/>
           </a:p>
@@ -908,7 +909,7 @@
           <a:p>
             <a:fld id="{C13FBCF6-97A0-4024-9E89-2567FE0DCFCF}" type="datetimeFigureOut">
               <a:rPr lang="en-IN" smtClean="0"/>
-              <a:t>19-06-2021</a:t>
+              <a:t>22-06-2021</a:t>
             </a:fld>
             <a:endParaRPr lang="en-IN"/>
           </a:p>
@@ -1118,7 +1119,7 @@
           <a:p>
             <a:fld id="{C13FBCF6-97A0-4024-9E89-2567FE0DCFCF}" type="datetimeFigureOut">
               <a:rPr lang="en-IN" smtClean="0"/>
-              <a:t>19-06-2021</a:t>
+              <a:t>22-06-2021</a:t>
             </a:fld>
             <a:endParaRPr lang="en-IN"/>
           </a:p>
@@ -1318,7 +1319,7 @@
           <a:p>
             <a:fld id="{C13FBCF6-97A0-4024-9E89-2567FE0DCFCF}" type="datetimeFigureOut">
               <a:rPr lang="en-IN" smtClean="0"/>
-              <a:t>19-06-2021</a:t>
+              <a:t>22-06-2021</a:t>
             </a:fld>
             <a:endParaRPr lang="en-IN"/>
           </a:p>
@@ -1594,7 +1595,7 @@
           <a:p>
             <a:fld id="{C13FBCF6-97A0-4024-9E89-2567FE0DCFCF}" type="datetimeFigureOut">
               <a:rPr lang="en-IN" smtClean="0"/>
-              <a:t>19-06-2021</a:t>
+              <a:t>22-06-2021</a:t>
             </a:fld>
             <a:endParaRPr lang="en-IN"/>
           </a:p>
@@ -1862,7 +1863,7 @@
           <a:p>
             <a:fld id="{C13FBCF6-97A0-4024-9E89-2567FE0DCFCF}" type="datetimeFigureOut">
               <a:rPr lang="en-IN" smtClean="0"/>
-              <a:t>19-06-2021</a:t>
+              <a:t>22-06-2021</a:t>
             </a:fld>
             <a:endParaRPr lang="en-IN"/>
           </a:p>
@@ -2277,7 +2278,7 @@
           <a:p>
             <a:fld id="{C13FBCF6-97A0-4024-9E89-2567FE0DCFCF}" type="datetimeFigureOut">
               <a:rPr lang="en-IN" smtClean="0"/>
-              <a:t>19-06-2021</a:t>
+              <a:t>22-06-2021</a:t>
             </a:fld>
             <a:endParaRPr lang="en-IN"/>
           </a:p>
@@ -2419,7 +2420,7 @@
           <a:p>
             <a:fld id="{C13FBCF6-97A0-4024-9E89-2567FE0DCFCF}" type="datetimeFigureOut">
               <a:rPr lang="en-IN" smtClean="0"/>
-              <a:t>19-06-2021</a:t>
+              <a:t>22-06-2021</a:t>
             </a:fld>
             <a:endParaRPr lang="en-IN"/>
           </a:p>
@@ -2532,7 +2533,7 @@
           <a:p>
             <a:fld id="{C13FBCF6-97A0-4024-9E89-2567FE0DCFCF}" type="datetimeFigureOut">
               <a:rPr lang="en-IN" smtClean="0"/>
-              <a:t>19-06-2021</a:t>
+              <a:t>22-06-2021</a:t>
             </a:fld>
             <a:endParaRPr lang="en-IN"/>
           </a:p>
@@ -2845,7 +2846,7 @@
           <a:p>
             <a:fld id="{C13FBCF6-97A0-4024-9E89-2567FE0DCFCF}" type="datetimeFigureOut">
               <a:rPr lang="en-IN" smtClean="0"/>
-              <a:t>19-06-2021</a:t>
+              <a:t>22-06-2021</a:t>
             </a:fld>
             <a:endParaRPr lang="en-IN"/>
           </a:p>
@@ -3134,7 +3135,7 @@
           <a:p>
             <a:fld id="{C13FBCF6-97A0-4024-9E89-2567FE0DCFCF}" type="datetimeFigureOut">
               <a:rPr lang="en-IN" smtClean="0"/>
-              <a:t>19-06-2021</a:t>
+              <a:t>22-06-2021</a:t>
             </a:fld>
             <a:endParaRPr lang="en-IN"/>
           </a:p>
@@ -3377,7 +3378,7 @@
           <a:p>
             <a:fld id="{C13FBCF6-97A0-4024-9E89-2567FE0DCFCF}" type="datetimeFigureOut">
               <a:rPr lang="en-IN" smtClean="0"/>
-              <a:t>19-06-2021</a:t>
+              <a:t>22-06-2021</a:t>
             </a:fld>
             <a:endParaRPr lang="en-IN"/>
           </a:p>
@@ -4123,6 +4124,104 @@
     <p:extLst>
       <p:ext uri="{BB962C8B-B14F-4D97-AF65-F5344CB8AC3E}">
         <p14:creationId xmlns:p14="http://schemas.microsoft.com/office/powerpoint/2010/main" val="3509324096"/>
+      </p:ext>
+    </p:extLst>
+  </p:cSld>
+  <p:clrMapOvr>
+    <a:masterClrMapping/>
+  </p:clrMapOvr>
+</p:sld>
+</file>
+
+<file path=ppt/slides/slide12.xml><?xml version="1.0" encoding="utf-8"?>
+<p:sld xmlns:a="http://schemas.openxmlformats.org/drawingml/2006/main" xmlns:r="http://schemas.openxmlformats.org/officeDocument/2006/relationships" xmlns:p="http://schemas.openxmlformats.org/presentationml/2006/main">
+  <p:cSld>
+    <p:spTree>
+      <p:nvGrpSpPr>
+        <p:cNvPr id="1" name=""/>
+        <p:cNvGrpSpPr/>
+        <p:nvPr/>
+      </p:nvGrpSpPr>
+      <p:grpSpPr>
+        <a:xfrm>
+          <a:off x="0" y="0"/>
+          <a:ext cx="0" cy="0"/>
+          <a:chOff x="0" y="0"/>
+          <a:chExt cx="0" cy="0"/>
+        </a:xfrm>
+      </p:grpSpPr>
+      <p:sp>
+        <p:nvSpPr>
+          <p:cNvPr id="2" name="Title 1">
+            <a:extLst>
+              <a:ext uri="{FF2B5EF4-FFF2-40B4-BE49-F238E27FC236}">
+                <a16:creationId xmlns:a16="http://schemas.microsoft.com/office/drawing/2014/main" id="{B93E6AD4-4D66-4A61-B810-753F1575C7DA}"/>
+              </a:ext>
+            </a:extLst>
+          </p:cNvPr>
+          <p:cNvSpPr>
+            <a:spLocks noGrp="1"/>
+          </p:cNvSpPr>
+          <p:nvPr>
+            <p:ph type="title"/>
+          </p:nvPr>
+        </p:nvSpPr>
+        <p:spPr/>
+        <p:txBody>
+          <a:bodyPr/>
+          <a:lstStyle/>
+          <a:p>
+            <a:r>
+              <a:rPr lang="en-US" dirty="0"/>
+              <a:t>TODO</a:t>
+            </a:r>
+            <a:endParaRPr lang="en-IN" dirty="0"/>
+          </a:p>
+        </p:txBody>
+      </p:sp>
+      <p:sp>
+        <p:nvSpPr>
+          <p:cNvPr id="3" name="Content Placeholder 2">
+            <a:extLst>
+              <a:ext uri="{FF2B5EF4-FFF2-40B4-BE49-F238E27FC236}">
+                <a16:creationId xmlns:a16="http://schemas.microsoft.com/office/drawing/2014/main" id="{A23EF04C-8D6D-453D-88C8-D79990329099}"/>
+              </a:ext>
+            </a:extLst>
+          </p:cNvPr>
+          <p:cNvSpPr>
+            <a:spLocks noGrp="1"/>
+          </p:cNvSpPr>
+          <p:nvPr>
+            <p:ph idx="1"/>
+          </p:nvPr>
+        </p:nvSpPr>
+        <p:spPr/>
+        <p:txBody>
+          <a:bodyPr/>
+          <a:lstStyle/>
+          <a:p>
+            <a:r>
+              <a:rPr lang="en-US" dirty="0"/>
+              <a:t>Write the model and solve it [URGENT]</a:t>
+            </a:r>
+          </a:p>
+          <a:p>
+            <a:r>
+              <a:rPr lang="en-US" dirty="0"/>
+              <a:t>Parallel libraries for </a:t>
+            </a:r>
+            <a:r>
+              <a:rPr lang="en-US"/>
+              <a:t>network flow</a:t>
+            </a:r>
+            <a:endParaRPr lang="en-IN"/>
+          </a:p>
+        </p:txBody>
+      </p:sp>
+    </p:spTree>
+    <p:extLst>
+      <p:ext uri="{BB962C8B-B14F-4D97-AF65-F5344CB8AC3E}">
+        <p14:creationId xmlns:p14="http://schemas.microsoft.com/office/powerpoint/2010/main" val="925107340"/>
       </p:ext>
     </p:extLst>
   </p:cSld>

</xml_diff>